<commit_message>
Modificación recursos empleados Necesarios
</commit_message>
<xml_diff>
--- a/Docs/Finales/Defensa Proyecto de Base de Datos.pptx
+++ b/Docs/Finales/Defensa Proyecto de Base de Datos.pptx
@@ -24,8 +24,9 @@
     <p:sldId id="283" r:id="rId18"/>
     <p:sldId id="284" r:id="rId19"/>
     <p:sldId id="270" r:id="rId20"/>
-    <p:sldId id="271" r:id="rId21"/>
-    <p:sldId id="285" r:id="rId22"/>
+    <p:sldId id="286" r:id="rId21"/>
+    <p:sldId id="271" r:id="rId22"/>
+    <p:sldId id="285" r:id="rId23"/>
   </p:sldIdLst>
   <p:sldSz cx="12192000" cy="6858000"/>
   <p:notesSz cx="6858000" cy="9144000"/>
@@ -279,7 +280,7 @@
           <a:p>
             <a:fld id="{42FED0DD-E224-46FA-8164-CFFAE7FFC6E7}" type="datetimeFigureOut">
               <a:rPr lang="es-ES" smtClean="0"/>
-              <a:t>22/05/2023</a:t>
+              <a:t>09/06/2023</a:t>
             </a:fld>
             <a:endParaRPr lang="es-ES" dirty="0"/>
           </a:p>
@@ -477,7 +478,7 @@
           <a:p>
             <a:fld id="{42FED0DD-E224-46FA-8164-CFFAE7FFC6E7}" type="datetimeFigureOut">
               <a:rPr lang="es-ES" smtClean="0"/>
-              <a:t>22/05/2023</a:t>
+              <a:t>09/06/2023</a:t>
             </a:fld>
             <a:endParaRPr lang="es-ES" dirty="0"/>
           </a:p>
@@ -685,7 +686,7 @@
           <a:p>
             <a:fld id="{42FED0DD-E224-46FA-8164-CFFAE7FFC6E7}" type="datetimeFigureOut">
               <a:rPr lang="es-ES" smtClean="0"/>
-              <a:t>22/05/2023</a:t>
+              <a:t>09/06/2023</a:t>
             </a:fld>
             <a:endParaRPr lang="es-ES" dirty="0"/>
           </a:p>
@@ -883,7 +884,7 @@
           <a:p>
             <a:fld id="{42FED0DD-E224-46FA-8164-CFFAE7FFC6E7}" type="datetimeFigureOut">
               <a:rPr lang="es-ES" smtClean="0"/>
-              <a:t>22/05/2023</a:t>
+              <a:t>09/06/2023</a:t>
             </a:fld>
             <a:endParaRPr lang="es-ES" dirty="0"/>
           </a:p>
@@ -1158,7 +1159,7 @@
           <a:p>
             <a:fld id="{42FED0DD-E224-46FA-8164-CFFAE7FFC6E7}" type="datetimeFigureOut">
               <a:rPr lang="es-ES" smtClean="0"/>
-              <a:t>22/05/2023</a:t>
+              <a:t>09/06/2023</a:t>
             </a:fld>
             <a:endParaRPr lang="es-ES" dirty="0"/>
           </a:p>
@@ -1423,7 +1424,7 @@
           <a:p>
             <a:fld id="{42FED0DD-E224-46FA-8164-CFFAE7FFC6E7}" type="datetimeFigureOut">
               <a:rPr lang="es-ES" smtClean="0"/>
-              <a:t>22/05/2023</a:t>
+              <a:t>09/06/2023</a:t>
             </a:fld>
             <a:endParaRPr lang="es-ES" dirty="0"/>
           </a:p>
@@ -1835,7 +1836,7 @@
           <a:p>
             <a:fld id="{42FED0DD-E224-46FA-8164-CFFAE7FFC6E7}" type="datetimeFigureOut">
               <a:rPr lang="es-ES" smtClean="0"/>
-              <a:t>22/05/2023</a:t>
+              <a:t>09/06/2023</a:t>
             </a:fld>
             <a:endParaRPr lang="es-ES" dirty="0"/>
           </a:p>
@@ -1976,7 +1977,7 @@
           <a:p>
             <a:fld id="{42FED0DD-E224-46FA-8164-CFFAE7FFC6E7}" type="datetimeFigureOut">
               <a:rPr lang="es-ES" smtClean="0"/>
-              <a:t>22/05/2023</a:t>
+              <a:t>09/06/2023</a:t>
             </a:fld>
             <a:endParaRPr lang="es-ES" dirty="0"/>
           </a:p>
@@ -2089,7 +2090,7 @@
           <a:p>
             <a:fld id="{42FED0DD-E224-46FA-8164-CFFAE7FFC6E7}" type="datetimeFigureOut">
               <a:rPr lang="es-ES" smtClean="0"/>
-              <a:t>22/05/2023</a:t>
+              <a:t>09/06/2023</a:t>
             </a:fld>
             <a:endParaRPr lang="es-ES" dirty="0"/>
           </a:p>
@@ -2400,7 +2401,7 @@
           <a:p>
             <a:fld id="{42FED0DD-E224-46FA-8164-CFFAE7FFC6E7}" type="datetimeFigureOut">
               <a:rPr lang="es-ES" smtClean="0"/>
-              <a:t>22/05/2023</a:t>
+              <a:t>09/06/2023</a:t>
             </a:fld>
             <a:endParaRPr lang="es-ES" dirty="0"/>
           </a:p>
@@ -2688,7 +2689,7 @@
           <a:p>
             <a:fld id="{42FED0DD-E224-46FA-8164-CFFAE7FFC6E7}" type="datetimeFigureOut">
               <a:rPr lang="es-ES" smtClean="0"/>
-              <a:t>22/05/2023</a:t>
+              <a:t>09/06/2023</a:t>
             </a:fld>
             <a:endParaRPr lang="es-ES" dirty="0"/>
           </a:p>
@@ -2929,7 +2930,7 @@
           <a:p>
             <a:fld id="{42FED0DD-E224-46FA-8164-CFFAE7FFC6E7}" type="datetimeFigureOut">
               <a:rPr lang="es-ES" smtClean="0"/>
-              <a:t>22/05/2023</a:t>
+              <a:t>09/06/2023</a:t>
             </a:fld>
             <a:endParaRPr lang="es-ES" dirty="0"/>
           </a:p>
@@ -11934,7 +11935,7 @@
                 <a:ea typeface="+mj-ea"/>
                 <a:cs typeface="+mj-cs"/>
               </a:rPr>
-              <a:t>RECURSOS EMPLEADOS / NECESARIOS</a:t>
+              <a:t>RECURSOS EMPLEADOS</a:t>
             </a:r>
           </a:p>
         </p:txBody>
@@ -11953,8 +11954,8 @@
         </p:nvSpPr>
         <p:spPr>
           <a:xfrm>
-            <a:off x="4243751" y="1007860"/>
-            <a:ext cx="6966116" cy="5004718"/>
+            <a:off x="4601043" y="1605515"/>
+            <a:ext cx="6966116" cy="2907871"/>
           </a:xfrm>
           <a:prstGeom prst="rect">
             <a:avLst/>
@@ -12040,7 +12041,7 @@
                 <a:ea typeface="+mn-ea"/>
                 <a:cs typeface="+mn-cs"/>
               </a:rPr>
-              <a:t>: Oracle Database 19c.</a:t>
+              <a:t>: Oracle Live SQL</a:t>
             </a:r>
           </a:p>
           <a:p>
@@ -12063,6 +12064,66 @@
               </a:rPr>
               <a:t>Software</a:t>
             </a:r>
+            <a:endParaRPr lang="en-US" sz="1600" b="1" dirty="0"/>
+          </a:p>
+          <a:p>
+            <a:pPr marL="742950" lvl="1" indent="-285750">
+              <a:lnSpc>
+                <a:spcPct val="90000"/>
+              </a:lnSpc>
+              <a:spcBef>
+                <a:spcPts val="1000"/>
+              </a:spcBef>
+              <a:buFont typeface="Arial" panose="020B0604020202020204" pitchFamily="34" charset="0"/>
+              <a:buChar char="•"/>
+            </a:pPr>
+            <a:r>
+              <a:rPr lang="en-US" sz="1600" b="1" kern="1200" dirty="0">
+                <a:effectLst/>
+                <a:latin typeface="+mn-lt"/>
+                <a:ea typeface="+mn-ea"/>
+                <a:cs typeface="+mn-cs"/>
+              </a:rPr>
+              <a:t>GitHub</a:t>
+            </a:r>
+            <a:r>
+              <a:rPr lang="en-US" sz="1600" kern="1200" dirty="0">
+                <a:effectLst/>
+                <a:latin typeface="+mn-lt"/>
+                <a:ea typeface="+mn-ea"/>
+                <a:cs typeface="+mn-cs"/>
+              </a:rPr>
+              <a:t>:</a:t>
+            </a:r>
+            <a:r>
+              <a:rPr lang="en-US" sz="1600" b="1" kern="1200" dirty="0">
+                <a:effectLst/>
+                <a:latin typeface="+mn-lt"/>
+                <a:ea typeface="+mn-ea"/>
+                <a:cs typeface="+mn-cs"/>
+              </a:rPr>
+              <a:t> </a:t>
+            </a:r>
+            <a:r>
+              <a:rPr lang="en-US" sz="1600" dirty="0"/>
+              <a:t>para </a:t>
+            </a:r>
+            <a:r>
+              <a:rPr lang="en-US" sz="1600" dirty="0" err="1"/>
+              <a:t>el</a:t>
+            </a:r>
+            <a:r>
+              <a:rPr lang="en-US" sz="1600" dirty="0"/>
+              <a:t> control de </a:t>
+            </a:r>
+            <a:r>
+              <a:rPr lang="en-US" sz="1600" dirty="0" err="1"/>
+              <a:t>versiones</a:t>
+            </a:r>
+            <a:r>
+              <a:rPr lang="en-US" sz="1600" dirty="0"/>
+              <a:t>.</a:t>
+            </a:r>
             <a:endParaRPr lang="en-US" sz="1600" kern="1200" dirty="0">
               <a:effectLst/>
               <a:latin typeface="+mn-lt"/>
@@ -12088,7 +12149,7 @@
                 <a:ea typeface="+mn-ea"/>
                 <a:cs typeface="+mn-cs"/>
               </a:rPr>
-              <a:t>Oracle 19c: </a:t>
+              <a:t>Oracle Live SQL</a:t>
             </a:r>
             <a:r>
               <a:rPr lang="en-US" sz="1600" kern="1200" dirty="0">
@@ -12097,7 +12158,7 @@
                 <a:ea typeface="+mn-ea"/>
                 <a:cs typeface="+mn-cs"/>
               </a:rPr>
-              <a:t>Para la creación de las tablas y para la administración de la base de </a:t>
+              <a:t>: para la  </a:t>
             </a:r>
             <a:r>
               <a:rPr lang="es-ES_tradnl" sz="1600" kern="1200" dirty="0">
@@ -12106,7 +12167,43 @@
                 <a:ea typeface="+mn-ea"/>
                 <a:cs typeface="+mn-cs"/>
               </a:rPr>
-              <a:t>datos</a:t>
+              <a:t>realización</a:t>
+            </a:r>
+            <a:r>
+              <a:rPr lang="en-US" sz="1600" kern="1200" dirty="0">
+                <a:effectLst/>
+                <a:latin typeface="+mn-lt"/>
+                <a:ea typeface="+mn-ea"/>
+                <a:cs typeface="+mn-cs"/>
+              </a:rPr>
+              <a:t> y </a:t>
+            </a:r>
+            <a:r>
+              <a:rPr lang="es-ES" sz="1600" kern="1200" dirty="0">
+                <a:effectLst/>
+                <a:latin typeface="+mn-lt"/>
+                <a:ea typeface="+mn-ea"/>
+                <a:cs typeface="+mn-cs"/>
+              </a:rPr>
+              <a:t>ejecución</a:t>
+            </a:r>
+            <a:r>
+              <a:rPr lang="en-US" sz="1600" kern="1200" dirty="0">
+                <a:effectLst/>
+                <a:latin typeface="+mn-lt"/>
+                <a:ea typeface="+mn-ea"/>
+                <a:cs typeface="+mn-cs"/>
+              </a:rPr>
+              <a:t> de las </a:t>
+            </a:r>
+            <a:r>
+              <a:rPr lang="es-ES" sz="1600" kern="1200" dirty="0">
+                <a:effectLst/>
+                <a:latin typeface="+mn-lt"/>
+                <a:ea typeface="+mn-ea"/>
+                <a:cs typeface="+mn-cs"/>
+              </a:rPr>
+              <a:t>consultas</a:t>
             </a:r>
             <a:r>
               <a:rPr lang="en-US" sz="1600" kern="1200" dirty="0">
@@ -12130,250 +12227,28 @@
               <a:buChar char="•"/>
             </a:pPr>
             <a:r>
-              <a:rPr lang="en-US" sz="1600" b="1" kern="1200" dirty="0">
-                <a:effectLst/>
-                <a:latin typeface="+mn-lt"/>
-                <a:ea typeface="+mn-ea"/>
-                <a:cs typeface="+mn-cs"/>
-              </a:rPr>
-              <a:t>Oracle Live SQL</a:t>
-            </a:r>
-            <a:r>
-              <a:rPr lang="en-US" sz="1600" kern="1200" dirty="0">
-                <a:effectLst/>
-                <a:latin typeface="+mn-lt"/>
-                <a:ea typeface="+mn-ea"/>
-                <a:cs typeface="+mn-cs"/>
-              </a:rPr>
-              <a:t>: Para la </a:t>
-            </a:r>
-            <a:r>
-              <a:rPr lang="es-ES_tradnl" sz="1600" kern="1200" dirty="0">
-                <a:effectLst/>
-                <a:latin typeface="+mn-lt"/>
-                <a:ea typeface="+mn-ea"/>
-                <a:cs typeface="+mn-cs"/>
-              </a:rPr>
-              <a:t>realización</a:t>
-            </a:r>
-            <a:r>
-              <a:rPr lang="en-US" sz="1600" kern="1200" dirty="0">
-                <a:effectLst/>
-                <a:latin typeface="+mn-lt"/>
-                <a:ea typeface="+mn-ea"/>
-                <a:cs typeface="+mn-cs"/>
-              </a:rPr>
-              <a:t> y </a:t>
-            </a:r>
-            <a:r>
-              <a:rPr lang="es-ES" sz="1600" kern="1200" dirty="0">
-                <a:effectLst/>
-                <a:latin typeface="+mn-lt"/>
-                <a:ea typeface="+mn-ea"/>
-                <a:cs typeface="+mn-cs"/>
-              </a:rPr>
-              <a:t>ejecución</a:t>
-            </a:r>
-            <a:r>
-              <a:rPr lang="en-US" sz="1600" kern="1200" dirty="0">
-                <a:effectLst/>
-                <a:latin typeface="+mn-lt"/>
-                <a:ea typeface="+mn-ea"/>
-                <a:cs typeface="+mn-cs"/>
-              </a:rPr>
-              <a:t> de las </a:t>
-            </a:r>
-            <a:r>
-              <a:rPr lang="es-ES" sz="1600" kern="1200" dirty="0">
-                <a:effectLst/>
-                <a:latin typeface="+mn-lt"/>
-                <a:ea typeface="+mn-ea"/>
-                <a:cs typeface="+mn-cs"/>
-              </a:rPr>
-              <a:t>consultas</a:t>
-            </a:r>
-            <a:r>
-              <a:rPr lang="en-US" sz="1600" kern="1200" dirty="0">
-                <a:effectLst/>
-                <a:latin typeface="+mn-lt"/>
-                <a:ea typeface="+mn-ea"/>
-                <a:cs typeface="+mn-cs"/>
-              </a:rPr>
+              <a:rPr lang="en-US" sz="1600" b="1" dirty="0"/>
+              <a:t>Power Designer</a:t>
+            </a:r>
+            <a:r>
+              <a:rPr lang="en-US" sz="1600" dirty="0"/>
+              <a:t>: para </a:t>
+            </a:r>
+            <a:r>
+              <a:rPr lang="en-US" sz="1600" dirty="0" err="1"/>
+              <a:t>modelar</a:t>
+            </a:r>
+            <a:r>
+              <a:rPr lang="en-US" sz="1600" dirty="0"/>
+              <a:t> la base de </a:t>
+            </a:r>
+            <a:r>
+              <a:rPr lang="en-US" sz="1600" dirty="0" err="1"/>
+              <a:t>datos</a:t>
+            </a:r>
+            <a:r>
+              <a:rPr lang="en-US" sz="1600" dirty="0"/>
               <a:t>.</a:t>
-            </a:r>
-          </a:p>
-          <a:p>
-            <a:pPr marL="285750" lvl="0" indent="-285750">
-              <a:lnSpc>
-                <a:spcPct val="90000"/>
-              </a:lnSpc>
-              <a:spcBef>
-                <a:spcPts val="1000"/>
-              </a:spcBef>
-              <a:buFont typeface="Arial" panose="020B0604020202020204" pitchFamily="34" charset="0"/>
-              <a:buChar char="•"/>
-            </a:pPr>
-            <a:r>
-              <a:rPr lang="en-US" sz="1600" b="1" kern="1200" dirty="0">
-                <a:effectLst/>
-                <a:latin typeface="+mn-lt"/>
-                <a:ea typeface="+mn-ea"/>
-                <a:cs typeface="+mn-cs"/>
-              </a:rPr>
-              <a:t>Arquitectura cliente-servidor.</a:t>
-            </a:r>
-            <a:endParaRPr lang="en-US" sz="1600" kern="1200" dirty="0">
-              <a:effectLst/>
-              <a:latin typeface="+mn-lt"/>
-              <a:ea typeface="+mn-ea"/>
-              <a:cs typeface="+mn-cs"/>
-            </a:endParaRPr>
-          </a:p>
-          <a:p>
-            <a:pPr marL="285750" lvl="0" indent="-285750">
-              <a:lnSpc>
-                <a:spcPct val="90000"/>
-              </a:lnSpc>
-              <a:spcBef>
-                <a:spcPts val="1000"/>
-              </a:spcBef>
-              <a:buFont typeface="Arial" panose="020B0604020202020204" pitchFamily="34" charset="0"/>
-              <a:buChar char="•"/>
-            </a:pPr>
-            <a:r>
-              <a:rPr lang="es-ES" sz="1600" b="1" kern="1200" dirty="0">
-                <a:effectLst/>
-                <a:latin typeface="+mn-lt"/>
-                <a:ea typeface="+mn-ea"/>
-                <a:cs typeface="+mn-cs"/>
-              </a:rPr>
-              <a:t>Requerimientos</a:t>
-            </a:r>
-            <a:r>
-              <a:rPr lang="en-US" sz="1600" b="1" kern="1200" dirty="0">
-                <a:effectLst/>
-                <a:latin typeface="+mn-lt"/>
-                <a:ea typeface="+mn-ea"/>
-                <a:cs typeface="+mn-cs"/>
-              </a:rPr>
-              <a:t> </a:t>
-            </a:r>
-            <a:r>
-              <a:rPr lang="es-ES" sz="1600" b="1" kern="1200" dirty="0">
-                <a:effectLst/>
-                <a:latin typeface="+mn-lt"/>
-                <a:ea typeface="+mn-ea"/>
-                <a:cs typeface="+mn-cs"/>
-              </a:rPr>
-              <a:t>técnicos</a:t>
-            </a:r>
-            <a:r>
-              <a:rPr lang="en-US" sz="1600" b="1" kern="1200" dirty="0">
-                <a:effectLst/>
-                <a:latin typeface="+mn-lt"/>
-                <a:ea typeface="+mn-ea"/>
-                <a:cs typeface="+mn-cs"/>
-              </a:rPr>
-              <a:t>:</a:t>
-            </a:r>
-            <a:r>
-              <a:rPr lang="en-US" sz="1600" kern="1200" dirty="0">
-                <a:effectLst/>
-                <a:latin typeface="+mn-lt"/>
-                <a:ea typeface="+mn-ea"/>
-                <a:cs typeface="+mn-cs"/>
-              </a:rPr>
-              <a:t> Para </a:t>
-            </a:r>
-            <a:r>
-              <a:rPr lang="es-ES" sz="1600" kern="1200" dirty="0">
-                <a:effectLst/>
-                <a:latin typeface="+mn-lt"/>
-                <a:ea typeface="+mn-ea"/>
-                <a:cs typeface="+mn-cs"/>
-              </a:rPr>
-              <a:t>instalar</a:t>
-            </a:r>
-            <a:r>
-              <a:rPr lang="en-US" sz="1600" kern="1200" dirty="0">
-                <a:effectLst/>
-                <a:latin typeface="+mn-lt"/>
-                <a:ea typeface="+mn-ea"/>
-                <a:cs typeface="+mn-cs"/>
-              </a:rPr>
-              <a:t> la BBDD tanto en Windows </a:t>
-            </a:r>
-            <a:r>
-              <a:rPr lang="es-ES" sz="1600" kern="1200" dirty="0">
-                <a:effectLst/>
-                <a:latin typeface="+mn-lt"/>
-                <a:ea typeface="+mn-ea"/>
-                <a:cs typeface="+mn-cs"/>
-              </a:rPr>
-              <a:t>como</a:t>
-            </a:r>
-            <a:r>
-              <a:rPr lang="en-US" sz="1600" kern="1200" dirty="0">
-                <a:effectLst/>
-                <a:latin typeface="+mn-lt"/>
-                <a:ea typeface="+mn-ea"/>
-                <a:cs typeface="+mn-cs"/>
-              </a:rPr>
-              <a:t> en Linux, </a:t>
-            </a:r>
-            <a:r>
-              <a:rPr lang="es-ES" sz="1600" kern="1200" dirty="0">
-                <a:effectLst/>
-                <a:latin typeface="+mn-lt"/>
-                <a:ea typeface="+mn-ea"/>
-                <a:cs typeface="+mn-cs"/>
-              </a:rPr>
-              <a:t>como</a:t>
-            </a:r>
-            <a:r>
-              <a:rPr lang="en-US" sz="1600" kern="1200" dirty="0">
-                <a:effectLst/>
-                <a:latin typeface="+mn-lt"/>
-                <a:ea typeface="+mn-ea"/>
-                <a:cs typeface="+mn-cs"/>
-              </a:rPr>
-              <a:t> </a:t>
-            </a:r>
-            <a:r>
-              <a:rPr lang="es-ES" sz="1600" kern="1200" dirty="0">
-                <a:effectLst/>
-                <a:latin typeface="+mn-lt"/>
-                <a:ea typeface="+mn-ea"/>
-                <a:cs typeface="+mn-cs"/>
-              </a:rPr>
-              <a:t>mínimo</a:t>
-            </a:r>
-            <a:r>
-              <a:rPr lang="en-US" sz="1600" kern="1200" dirty="0">
-                <a:effectLst/>
-                <a:latin typeface="+mn-lt"/>
-                <a:ea typeface="+mn-ea"/>
-                <a:cs typeface="+mn-cs"/>
-              </a:rPr>
-              <a:t> </a:t>
-            </a:r>
-            <a:r>
-              <a:rPr lang="es-ES" sz="1600" kern="1200" dirty="0">
-                <a:effectLst/>
-                <a:latin typeface="+mn-lt"/>
-                <a:ea typeface="+mn-ea"/>
-                <a:cs typeface="+mn-cs"/>
-              </a:rPr>
-              <a:t>deberemos</a:t>
-            </a:r>
-            <a:r>
-              <a:rPr lang="en-US" sz="1600" kern="1200" dirty="0">
-                <a:effectLst/>
-                <a:latin typeface="+mn-lt"/>
-                <a:ea typeface="+mn-ea"/>
-                <a:cs typeface="+mn-cs"/>
-              </a:rPr>
-              <a:t> disponer de:</a:t>
             </a:r>
           </a:p>
           <a:p>
@@ -12388,149 +12263,41 @@
               <a:buChar char="•"/>
             </a:pPr>
             <a:r>
+              <a:rPr lang="en-US" sz="1600" b="1" kern="1200" dirty="0">
+                <a:effectLst/>
+                <a:latin typeface="+mn-lt"/>
+                <a:ea typeface="+mn-ea"/>
+                <a:cs typeface="+mn-cs"/>
+              </a:rPr>
+              <a:t>Visual Studio Code</a:t>
+            </a:r>
+            <a:r>
               <a:rPr lang="en-US" sz="1600" kern="1200" dirty="0">
                 <a:effectLst/>
                 <a:latin typeface="+mn-lt"/>
                 <a:ea typeface="+mn-ea"/>
                 <a:cs typeface="+mn-cs"/>
               </a:rPr>
-              <a:t>4GB de RAM.</a:t>
-            </a:r>
-          </a:p>
-          <a:p>
-            <a:pPr marL="742950" lvl="2" indent="-285750">
-              <a:lnSpc>
-                <a:spcPct val="90000"/>
-              </a:lnSpc>
-              <a:spcBef>
-                <a:spcPts val="1000"/>
-              </a:spcBef>
-              <a:buFont typeface="Arial" panose="020B0604020202020204" pitchFamily="34" charset="0"/>
-              <a:buChar char="•"/>
-            </a:pPr>
-            <a:r>
-              <a:rPr lang="en-US" sz="1600" kern="1200" dirty="0">
-                <a:effectLst/>
-                <a:latin typeface="+mn-lt"/>
-                <a:ea typeface="+mn-ea"/>
-                <a:cs typeface="+mn-cs"/>
-              </a:rPr>
-              <a:t>1,4 GHz de </a:t>
-            </a:r>
-            <a:r>
-              <a:rPr lang="es-ES" sz="1600" kern="1200" dirty="0">
-                <a:effectLst/>
-                <a:latin typeface="+mn-lt"/>
-                <a:ea typeface="+mn-ea"/>
-                <a:cs typeface="+mn-cs"/>
-              </a:rPr>
-              <a:t>procesador</a:t>
-            </a:r>
-            <a:r>
-              <a:rPr lang="en-US" sz="1600" kern="1200" dirty="0">
-                <a:effectLst/>
-                <a:latin typeface="+mn-lt"/>
-                <a:ea typeface="+mn-ea"/>
-                <a:cs typeface="+mn-cs"/>
-              </a:rPr>
-              <a:t>.</a:t>
-            </a:r>
-          </a:p>
-          <a:p>
-            <a:pPr marL="742950" lvl="2" indent="-285750">
-              <a:lnSpc>
-                <a:spcPct val="90000"/>
-              </a:lnSpc>
-              <a:spcBef>
-                <a:spcPts val="1000"/>
-              </a:spcBef>
-              <a:buFont typeface="Arial" panose="020B0604020202020204" pitchFamily="34" charset="0"/>
-              <a:buChar char="•"/>
-            </a:pPr>
-            <a:r>
-              <a:rPr lang="en-US" sz="1600" kern="1200" dirty="0">
-                <a:effectLst/>
-                <a:latin typeface="+mn-lt"/>
-                <a:ea typeface="+mn-ea"/>
-                <a:cs typeface="+mn-cs"/>
-              </a:rPr>
-              <a:t>20GB de </a:t>
-            </a:r>
-            <a:r>
-              <a:rPr lang="es-ES" sz="1600" kern="1200" dirty="0">
-                <a:effectLst/>
-                <a:latin typeface="+mn-lt"/>
-                <a:ea typeface="+mn-ea"/>
-                <a:cs typeface="+mn-cs"/>
-              </a:rPr>
-              <a:t>espacio</a:t>
-            </a:r>
-            <a:r>
-              <a:rPr lang="en-US" sz="1600" kern="1200" dirty="0">
-                <a:effectLst/>
-                <a:latin typeface="+mn-lt"/>
-                <a:ea typeface="+mn-ea"/>
-                <a:cs typeface="+mn-cs"/>
-              </a:rPr>
-              <a:t> en disco.</a:t>
-            </a:r>
-          </a:p>
-          <a:p>
-            <a:pPr marL="742950" lvl="2" indent="-285750">
-              <a:lnSpc>
-                <a:spcPct val="90000"/>
-              </a:lnSpc>
-              <a:spcBef>
-                <a:spcPts val="1000"/>
-              </a:spcBef>
-              <a:buFont typeface="Arial" panose="020B0604020202020204" pitchFamily="34" charset="0"/>
-              <a:buChar char="•"/>
-            </a:pPr>
-            <a:r>
-              <a:rPr lang="en-US" sz="1600" kern="1200" dirty="0">
-                <a:effectLst/>
-                <a:latin typeface="+mn-lt"/>
-                <a:ea typeface="+mn-ea"/>
-                <a:cs typeface="+mn-cs"/>
-              </a:rPr>
-              <a:t>Si es Linux, se </a:t>
-            </a:r>
-            <a:r>
-              <a:rPr lang="es-ES" sz="1600" kern="1200" dirty="0">
-                <a:effectLst/>
-                <a:latin typeface="+mn-lt"/>
-                <a:ea typeface="+mn-ea"/>
-                <a:cs typeface="+mn-cs"/>
-              </a:rPr>
-              <a:t>necesitará </a:t>
-            </a:r>
-            <a:r>
-              <a:rPr lang="en-US" sz="1600" kern="1200" dirty="0">
-                <a:effectLst/>
-                <a:latin typeface="+mn-lt"/>
-                <a:ea typeface="+mn-ea"/>
-                <a:cs typeface="+mn-cs"/>
-              </a:rPr>
-              <a:t>que </a:t>
-            </a:r>
-            <a:r>
-              <a:rPr lang="es-ES" sz="1600" kern="1200" dirty="0">
-                <a:effectLst/>
-                <a:latin typeface="+mn-lt"/>
-                <a:ea typeface="+mn-ea"/>
-                <a:cs typeface="+mn-cs"/>
-              </a:rPr>
-              <a:t>tenga</a:t>
-            </a:r>
-            <a:r>
-              <a:rPr lang="en-US" sz="1600" kern="1200" dirty="0">
-                <a:effectLst/>
-                <a:latin typeface="+mn-lt"/>
-                <a:ea typeface="+mn-ea"/>
-                <a:cs typeface="+mn-cs"/>
-              </a:rPr>
-              <a:t> terminal o GUI (Graphics User Interfaces).</a:t>
-            </a:r>
+              <a:t>: para </a:t>
+            </a:r>
+            <a:r>
+              <a:rPr lang="en-US" sz="1600" dirty="0"/>
+              <a:t>la </a:t>
+            </a:r>
+            <a:r>
+              <a:rPr lang="en-US" sz="1600" dirty="0" err="1"/>
+              <a:t>modificación</a:t>
+            </a:r>
+            <a:r>
+              <a:rPr lang="en-US" sz="1600" dirty="0"/>
+              <a:t> de scripts.</a:t>
+            </a:r>
+            <a:endParaRPr lang="en-US" sz="1600" kern="1200" dirty="0">
+              <a:effectLst/>
+              <a:latin typeface="+mn-lt"/>
+              <a:ea typeface="+mn-ea"/>
+              <a:cs typeface="+mn-cs"/>
+            </a:endParaRPr>
           </a:p>
         </p:txBody>
       </p:sp>
@@ -14278,6 +14045,1160 @@
 </file>
 
 <file path=ppt/slides/slide20.xml><?xml version="1.0" encoding="utf-8"?>
+<p:sld xmlns:a="http://schemas.openxmlformats.org/drawingml/2006/main" xmlns:r="http://schemas.openxmlformats.org/officeDocument/2006/relationships" xmlns:p="http://schemas.openxmlformats.org/presentationml/2006/main">
+  <p:cSld>
+    <p:bg>
+      <p:bgPr>
+        <a:solidFill>
+          <a:schemeClr val="bg1"/>
+        </a:solidFill>
+        <a:effectLst/>
+      </p:bgPr>
+    </p:bg>
+    <p:spTree>
+      <p:nvGrpSpPr>
+        <p:cNvPr id="1" name=""/>
+        <p:cNvGrpSpPr/>
+        <p:nvPr/>
+      </p:nvGrpSpPr>
+      <p:grpSpPr>
+        <a:xfrm>
+          <a:off x="0" y="0"/>
+          <a:ext cx="0" cy="0"/>
+          <a:chOff x="0" y="0"/>
+          <a:chExt cx="0" cy="0"/>
+        </a:xfrm>
+      </p:grpSpPr>
+      <p:sp useBgFill="1">
+        <p:nvSpPr>
+          <p:cNvPr id="20" name="Rectangle 12">
+            <a:extLst>
+              <a:ext uri="{FF2B5EF4-FFF2-40B4-BE49-F238E27FC236}">
+                <a16:creationId xmlns:a16="http://schemas.microsoft.com/office/drawing/2014/main" id="{A8384FB5-9ADC-4DDC-881B-597D56F5B15D}"/>
+              </a:ext>
+              <a:ext uri="{C183D7F6-B498-43B3-948B-1728B52AA6E4}">
+                <adec:decorative xmlns:adec="http://schemas.microsoft.com/office/drawing/2017/decorative" val="1"/>
+              </a:ext>
+            </a:extLst>
+          </p:cNvPr>
+          <p:cNvSpPr>
+            <a:spLocks noGrp="1" noRot="1" noChangeAspect="1" noMove="1" noResize="1" noEditPoints="1" noAdjustHandles="1" noChangeArrowheads="1" noChangeShapeType="1" noTextEdit="1"/>
+          </p:cNvSpPr>
+          <p:nvPr>
+            <p:extLst>
+              <p:ext uri="{386F3935-93C4-4BCD-93E2-E3B085C9AB24}">
+                <p16:designElem xmlns:p16="http://schemas.microsoft.com/office/powerpoint/2015/main" val="1"/>
+              </p:ext>
+            </p:extLst>
+          </p:nvPr>
+        </p:nvSpPr>
+        <p:spPr>
+          <a:xfrm>
+            <a:off x="0" y="0"/>
+            <a:ext cx="12192000" cy="6858000"/>
+          </a:xfrm>
+          <a:prstGeom prst="rect">
+            <a:avLst/>
+          </a:prstGeom>
+          <a:ln w="12700" cap="flat" cmpd="sng" algn="ctr">
+            <a:noFill/>
+            <a:prstDash val="solid"/>
+            <a:miter lim="800000"/>
+          </a:ln>
+          <a:effectLst/>
+          <a:extLst>
+            <a:ext uri="{91240B29-F687-4F45-9708-019B960494DF}">
+              <a14:hiddenLine xmlns:a14="http://schemas.microsoft.com/office/drawing/2010/main" w="12700" cap="flat" cmpd="sng" algn="ctr">
+                <a:solidFill>
+                  <a:schemeClr val="accent1">
+                    <a:shade val="50000"/>
+                  </a:schemeClr>
+                </a:solidFill>
+                <a:prstDash val="solid"/>
+                <a:miter lim="800000"/>
+              </a14:hiddenLine>
+            </a:ext>
+          </a:extLst>
+        </p:spPr>
+        <p:style>
+          <a:lnRef idx="2">
+            <a:schemeClr val="accent1">
+              <a:shade val="50000"/>
+            </a:schemeClr>
+          </a:lnRef>
+          <a:fillRef idx="1">
+            <a:schemeClr val="accent1"/>
+          </a:fillRef>
+          <a:effectRef idx="0">
+            <a:schemeClr val="accent1"/>
+          </a:effectRef>
+          <a:fontRef idx="minor">
+            <a:schemeClr val="lt1"/>
+          </a:fontRef>
+        </p:style>
+        <p:txBody>
+          <a:bodyPr rtlCol="0" anchor="ctr"/>
+          <a:lstStyle/>
+          <a:p>
+            <a:pPr algn="ctr"/>
+            <a:endParaRPr lang="en-US" dirty="0"/>
+          </a:p>
+        </p:txBody>
+      </p:sp>
+      <p:sp>
+        <p:nvSpPr>
+          <p:cNvPr id="22" name="Rectangle 14">
+            <a:extLst>
+              <a:ext uri="{FF2B5EF4-FFF2-40B4-BE49-F238E27FC236}">
+                <a16:creationId xmlns:a16="http://schemas.microsoft.com/office/drawing/2014/main" id="{91E5A9A7-95C6-4F4F-B00E-C82E07FE62EF}"/>
+              </a:ext>
+              <a:ext uri="{C183D7F6-B498-43B3-948B-1728B52AA6E4}">
+                <adec:decorative xmlns:adec="http://schemas.microsoft.com/office/drawing/2017/decorative" val="1"/>
+              </a:ext>
+            </a:extLst>
+          </p:cNvPr>
+          <p:cNvSpPr>
+            <a:spLocks noGrp="1" noRot="1" noChangeAspect="1" noMove="1" noResize="1" noEditPoints="1" noAdjustHandles="1" noChangeArrowheads="1" noChangeShapeType="1" noTextEdit="1"/>
+          </p:cNvSpPr>
+          <p:nvPr>
+            <p:extLst>
+              <p:ext uri="{386F3935-93C4-4BCD-93E2-E3B085C9AB24}">
+                <p16:designElem xmlns:p16="http://schemas.microsoft.com/office/powerpoint/2015/main" val="1"/>
+              </p:ext>
+            </p:extLst>
+          </p:nvPr>
+        </p:nvSpPr>
+        <p:spPr>
+          <a:xfrm rot="5400000" flipH="1">
+            <a:off x="-1417539" y="1417538"/>
+            <a:ext cx="6875818" cy="4040744"/>
+          </a:xfrm>
+          <a:prstGeom prst="rect">
+            <a:avLst/>
+          </a:prstGeom>
+          <a:gradFill>
+            <a:gsLst>
+              <a:gs pos="0">
+                <a:srgbClr val="000000"/>
+              </a:gs>
+              <a:gs pos="100000">
+                <a:schemeClr val="accent1">
+                  <a:lumMod val="75000"/>
+                </a:schemeClr>
+              </a:gs>
+            </a:gsLst>
+            <a:lin ang="18600000" scaled="0"/>
+          </a:gradFill>
+          <a:ln>
+            <a:noFill/>
+          </a:ln>
+        </p:spPr>
+        <p:style>
+          <a:lnRef idx="2">
+            <a:schemeClr val="accent1">
+              <a:shade val="50000"/>
+            </a:schemeClr>
+          </a:lnRef>
+          <a:fillRef idx="1">
+            <a:schemeClr val="accent1"/>
+          </a:fillRef>
+          <a:effectRef idx="0">
+            <a:schemeClr val="accent1"/>
+          </a:effectRef>
+          <a:fontRef idx="minor">
+            <a:schemeClr val="lt1"/>
+          </a:fontRef>
+        </p:style>
+        <p:txBody>
+          <a:bodyPr rtlCol="0" anchor="ctr"/>
+          <a:lstStyle/>
+          <a:p>
+            <a:pPr algn="ctr"/>
+            <a:endParaRPr lang="en-US" dirty="0"/>
+          </a:p>
+        </p:txBody>
+      </p:sp>
+      <p:sp>
+        <p:nvSpPr>
+          <p:cNvPr id="23" name="Rectangle 16">
+            <a:extLst>
+              <a:ext uri="{FF2B5EF4-FFF2-40B4-BE49-F238E27FC236}">
+                <a16:creationId xmlns:a16="http://schemas.microsoft.com/office/drawing/2014/main" id="{D07DD2DE-F619-49DD-B5E7-03A290FF4ED1}"/>
+              </a:ext>
+              <a:ext uri="{C183D7F6-B498-43B3-948B-1728B52AA6E4}">
+                <adec:decorative xmlns:adec="http://schemas.microsoft.com/office/drawing/2017/decorative" val="1"/>
+              </a:ext>
+            </a:extLst>
+          </p:cNvPr>
+          <p:cNvSpPr>
+            <a:spLocks noGrp="1" noRot="1" noChangeAspect="1" noMove="1" noResize="1" noEditPoints="1" noAdjustHandles="1" noChangeArrowheads="1" noChangeShapeType="1" noTextEdit="1"/>
+          </p:cNvSpPr>
+          <p:nvPr>
+            <p:extLst>
+              <p:ext uri="{386F3935-93C4-4BCD-93E2-E3B085C9AB24}">
+                <p16:designElem xmlns:p16="http://schemas.microsoft.com/office/powerpoint/2015/main" val="1"/>
+              </p:ext>
+            </p:extLst>
+          </p:nvPr>
+        </p:nvSpPr>
+        <p:spPr>
+          <a:xfrm rot="16200000">
+            <a:off x="-158495" y="2660473"/>
+            <a:ext cx="4355594" cy="4038603"/>
+          </a:xfrm>
+          <a:prstGeom prst="rect">
+            <a:avLst/>
+          </a:prstGeom>
+          <a:gradFill>
+            <a:gsLst>
+              <a:gs pos="0">
+                <a:schemeClr val="accent1">
+                  <a:alpha val="50000"/>
+                </a:schemeClr>
+              </a:gs>
+              <a:gs pos="100000">
+                <a:schemeClr val="accent1">
+                  <a:lumMod val="50000"/>
+                  <a:alpha val="0"/>
+                </a:schemeClr>
+              </a:gs>
+            </a:gsLst>
+            <a:lin ang="11400000" scaled="0"/>
+          </a:gradFill>
+          <a:ln>
+            <a:noFill/>
+          </a:ln>
+        </p:spPr>
+        <p:style>
+          <a:lnRef idx="2">
+            <a:schemeClr val="accent1">
+              <a:shade val="50000"/>
+            </a:schemeClr>
+          </a:lnRef>
+          <a:fillRef idx="1">
+            <a:schemeClr val="accent1"/>
+          </a:fillRef>
+          <a:effectRef idx="0">
+            <a:schemeClr val="accent1"/>
+          </a:effectRef>
+          <a:fontRef idx="minor">
+            <a:schemeClr val="lt1"/>
+          </a:fontRef>
+        </p:style>
+        <p:txBody>
+          <a:bodyPr rtlCol="0" anchor="ctr"/>
+          <a:lstStyle/>
+          <a:p>
+            <a:pPr algn="ctr"/>
+            <a:endParaRPr lang="en-US" dirty="0"/>
+          </a:p>
+        </p:txBody>
+      </p:sp>
+      <p:sp>
+        <p:nvSpPr>
+          <p:cNvPr id="19" name="Rectangle 18">
+            <a:extLst>
+              <a:ext uri="{FF2B5EF4-FFF2-40B4-BE49-F238E27FC236}">
+                <a16:creationId xmlns:a16="http://schemas.microsoft.com/office/drawing/2014/main" id="{85149191-5F60-4A28-AAFF-039F96B0F3EC}"/>
+              </a:ext>
+              <a:ext uri="{C183D7F6-B498-43B3-948B-1728B52AA6E4}">
+                <adec:decorative xmlns:adec="http://schemas.microsoft.com/office/drawing/2017/decorative" val="1"/>
+              </a:ext>
+            </a:extLst>
+          </p:cNvPr>
+          <p:cNvSpPr>
+            <a:spLocks noGrp="1" noRot="1" noChangeAspect="1" noMove="1" noResize="1" noEditPoints="1" noAdjustHandles="1" noChangeArrowheads="1" noChangeShapeType="1" noTextEdit="1"/>
+          </p:cNvSpPr>
+          <p:nvPr>
+            <p:extLst>
+              <p:ext uri="{386F3935-93C4-4BCD-93E2-E3B085C9AB24}">
+                <p16:designElem xmlns:p16="http://schemas.microsoft.com/office/powerpoint/2015/main" val="1"/>
+              </p:ext>
+            </p:extLst>
+          </p:nvPr>
+        </p:nvSpPr>
+        <p:spPr>
+          <a:xfrm rot="16200000" flipH="1">
+            <a:off x="-1180882" y="1638085"/>
+            <a:ext cx="6857572" cy="3581401"/>
+          </a:xfrm>
+          <a:prstGeom prst="rect">
+            <a:avLst/>
+          </a:prstGeom>
+          <a:gradFill>
+            <a:gsLst>
+              <a:gs pos="0">
+                <a:srgbClr val="000000">
+                  <a:alpha val="59000"/>
+                </a:srgbClr>
+              </a:gs>
+              <a:gs pos="69000">
+                <a:schemeClr val="accent1">
+                  <a:alpha val="0"/>
+                </a:schemeClr>
+              </a:gs>
+            </a:gsLst>
+            <a:lin ang="13200000" scaled="0"/>
+          </a:gradFill>
+          <a:ln>
+            <a:noFill/>
+          </a:ln>
+        </p:spPr>
+        <p:style>
+          <a:lnRef idx="2">
+            <a:schemeClr val="accent1">
+              <a:shade val="50000"/>
+            </a:schemeClr>
+          </a:lnRef>
+          <a:fillRef idx="1">
+            <a:schemeClr val="accent1"/>
+          </a:fillRef>
+          <a:effectRef idx="0">
+            <a:schemeClr val="accent1"/>
+          </a:effectRef>
+          <a:fontRef idx="minor">
+            <a:schemeClr val="lt1"/>
+          </a:fontRef>
+        </p:style>
+        <p:txBody>
+          <a:bodyPr rtlCol="0" anchor="ctr"/>
+          <a:lstStyle/>
+          <a:p>
+            <a:pPr algn="ctr"/>
+            <a:endParaRPr lang="en-US" dirty="0"/>
+          </a:p>
+        </p:txBody>
+      </p:sp>
+      <p:sp>
+        <p:nvSpPr>
+          <p:cNvPr id="21" name="Freeform: Shape 20">
+            <a:extLst>
+              <a:ext uri="{FF2B5EF4-FFF2-40B4-BE49-F238E27FC236}">
+                <a16:creationId xmlns:a16="http://schemas.microsoft.com/office/drawing/2014/main" id="{F8260ED5-17F7-4158-B241-D51DD4CF1B7E}"/>
+              </a:ext>
+              <a:ext uri="{C183D7F6-B498-43B3-948B-1728B52AA6E4}">
+                <adec:decorative xmlns:adec="http://schemas.microsoft.com/office/drawing/2017/decorative" val="1"/>
+              </a:ext>
+            </a:extLst>
+          </p:cNvPr>
+          <p:cNvSpPr>
+            <a:spLocks noGrp="1" noRot="1" noChangeAspect="1" noMove="1" noResize="1" noEditPoints="1" noAdjustHandles="1" noChangeArrowheads="1" noChangeShapeType="1" noTextEdit="1"/>
+          </p:cNvSpPr>
+          <p:nvPr>
+            <p:extLst>
+              <p:ext uri="{386F3935-93C4-4BCD-93E2-E3B085C9AB24}">
+                <p16:designElem xmlns:p16="http://schemas.microsoft.com/office/powerpoint/2015/main" val="1"/>
+              </p:ext>
+            </p:extLst>
+          </p:nvPr>
+        </p:nvSpPr>
+        <p:spPr>
+          <a:xfrm rot="6097846">
+            <a:off x="-747355" y="1201312"/>
+            <a:ext cx="4808302" cy="4088666"/>
+          </a:xfrm>
+          <a:custGeom>
+            <a:avLst/>
+            <a:gdLst>
+              <a:gd name="connsiteX0" fmla="*/ 48844 w 4808302"/>
+              <a:gd name="connsiteY0" fmla="*/ 2888671 h 4088666"/>
+              <a:gd name="connsiteX1" fmla="*/ 0 w 4808302"/>
+              <a:gd name="connsiteY1" fmla="*/ 2404151 h 4088666"/>
+              <a:gd name="connsiteX2" fmla="*/ 2404151 w 4808302"/>
+              <a:gd name="connsiteY2" fmla="*/ 0 h 4088666"/>
+              <a:gd name="connsiteX3" fmla="*/ 4808302 w 4808302"/>
+              <a:gd name="connsiteY3" fmla="*/ 2404151 h 4088666"/>
+              <a:gd name="connsiteX4" fmla="*/ 4700216 w 4808302"/>
+              <a:gd name="connsiteY4" fmla="*/ 3119072 h 4088666"/>
+              <a:gd name="connsiteX5" fmla="*/ 4643143 w 4808302"/>
+              <a:gd name="connsiteY5" fmla="*/ 3275009 h 4088666"/>
+              <a:gd name="connsiteX6" fmla="*/ 690093 w 4808302"/>
+              <a:gd name="connsiteY6" fmla="*/ 4088666 h 4088666"/>
+              <a:gd name="connsiteX7" fmla="*/ 548991 w 4808302"/>
+              <a:gd name="connsiteY7" fmla="*/ 3933414 h 4088666"/>
+              <a:gd name="connsiteX8" fmla="*/ 48844 w 4808302"/>
+              <a:gd name="connsiteY8" fmla="*/ 2888671 h 4088666"/>
+            </a:gdLst>
+            <a:ahLst/>
+            <a:cxnLst>
+              <a:cxn ang="0">
+                <a:pos x="connsiteX0" y="connsiteY0"/>
+              </a:cxn>
+              <a:cxn ang="0">
+                <a:pos x="connsiteX1" y="connsiteY1"/>
+              </a:cxn>
+              <a:cxn ang="0">
+                <a:pos x="connsiteX2" y="connsiteY2"/>
+              </a:cxn>
+              <a:cxn ang="0">
+                <a:pos x="connsiteX3" y="connsiteY3"/>
+              </a:cxn>
+              <a:cxn ang="0">
+                <a:pos x="connsiteX4" y="connsiteY4"/>
+              </a:cxn>
+              <a:cxn ang="0">
+                <a:pos x="connsiteX5" y="connsiteY5"/>
+              </a:cxn>
+              <a:cxn ang="0">
+                <a:pos x="connsiteX6" y="connsiteY6"/>
+              </a:cxn>
+              <a:cxn ang="0">
+                <a:pos x="connsiteX7" y="connsiteY7"/>
+              </a:cxn>
+              <a:cxn ang="0">
+                <a:pos x="connsiteX8" y="connsiteY8"/>
+              </a:cxn>
+            </a:cxnLst>
+            <a:rect l="l" t="t" r="r" b="b"/>
+            <a:pathLst>
+              <a:path w="4808302" h="4088666">
+                <a:moveTo>
+                  <a:pt x="48844" y="2888671"/>
+                </a:moveTo>
+                <a:cubicBezTo>
+                  <a:pt x="16818" y="2732167"/>
+                  <a:pt x="0" y="2570123"/>
+                  <a:pt x="0" y="2404151"/>
+                </a:cubicBezTo>
+                <a:cubicBezTo>
+                  <a:pt x="0" y="1076375"/>
+                  <a:pt x="1076375" y="0"/>
+                  <a:pt x="2404151" y="0"/>
+                </a:cubicBezTo>
+                <a:cubicBezTo>
+                  <a:pt x="3731927" y="0"/>
+                  <a:pt x="4808302" y="1076375"/>
+                  <a:pt x="4808302" y="2404151"/>
+                </a:cubicBezTo>
+                <a:cubicBezTo>
+                  <a:pt x="4808302" y="2653109"/>
+                  <a:pt x="4770461" y="2893229"/>
+                  <a:pt x="4700216" y="3119072"/>
+                </a:cubicBezTo>
+                <a:lnTo>
+                  <a:pt x="4643143" y="3275009"/>
+                </a:lnTo>
+                <a:lnTo>
+                  <a:pt x="690093" y="4088666"/>
+                </a:lnTo>
+                <a:lnTo>
+                  <a:pt x="548991" y="3933414"/>
+                </a:lnTo>
+                <a:cubicBezTo>
+                  <a:pt x="304015" y="3636572"/>
+                  <a:pt x="128908" y="3279932"/>
+                  <a:pt x="48844" y="2888671"/>
+                </a:cubicBezTo>
+                <a:close/>
+              </a:path>
+            </a:pathLst>
+          </a:custGeom>
+          <a:gradFill>
+            <a:gsLst>
+              <a:gs pos="39000">
+                <a:schemeClr val="accent1">
+                  <a:lumMod val="60000"/>
+                  <a:lumOff val="40000"/>
+                  <a:alpha val="0"/>
+                </a:schemeClr>
+              </a:gs>
+              <a:gs pos="100000">
+                <a:schemeClr val="accent1">
+                  <a:lumMod val="75000"/>
+                  <a:alpha val="26000"/>
+                </a:schemeClr>
+              </a:gs>
+            </a:gsLst>
+            <a:lin ang="18600000" scaled="0"/>
+          </a:gradFill>
+          <a:ln>
+            <a:noFill/>
+          </a:ln>
+        </p:spPr>
+        <p:style>
+          <a:lnRef idx="2">
+            <a:schemeClr val="accent1">
+              <a:shade val="50000"/>
+            </a:schemeClr>
+          </a:lnRef>
+          <a:fillRef idx="1">
+            <a:schemeClr val="accent1"/>
+          </a:fillRef>
+          <a:effectRef idx="0">
+            <a:schemeClr val="accent1"/>
+          </a:effectRef>
+          <a:fontRef idx="minor">
+            <a:schemeClr val="lt1"/>
+          </a:fontRef>
+        </p:style>
+        <p:txBody>
+          <a:bodyPr wrap="square" rtlCol="0" anchor="ctr">
+            <a:noAutofit/>
+          </a:bodyPr>
+          <a:lstStyle/>
+          <a:p>
+            <a:pPr algn="ctr"/>
+            <a:endParaRPr lang="en-US" dirty="0"/>
+          </a:p>
+        </p:txBody>
+      </p:sp>
+      <p:sp>
+        <p:nvSpPr>
+          <p:cNvPr id="2" name="Título 1">
+            <a:extLst>
+              <a:ext uri="{FF2B5EF4-FFF2-40B4-BE49-F238E27FC236}">
+                <a16:creationId xmlns:a16="http://schemas.microsoft.com/office/drawing/2014/main" id="{1BD3D87C-EC37-A28E-91B9-30D45EFD07FD}"/>
+              </a:ext>
+            </a:extLst>
+          </p:cNvPr>
+          <p:cNvSpPr>
+            <a:spLocks noGrp="1"/>
+          </p:cNvSpPr>
+          <p:nvPr>
+            <p:ph type="title"/>
+          </p:nvPr>
+        </p:nvSpPr>
+        <p:spPr>
+          <a:xfrm>
+            <a:off x="853000" y="2366610"/>
+            <a:ext cx="3104112" cy="1758069"/>
+          </a:xfrm>
+        </p:spPr>
+        <p:txBody>
+          <a:bodyPr vert="horz" lIns="91440" tIns="45720" rIns="91440" bIns="45720" rtlCol="0" anchor="t">
+            <a:normAutofit/>
+          </a:bodyPr>
+          <a:lstStyle/>
+          <a:p>
+            <a:pPr algn="r"/>
+            <a:r>
+              <a:rPr lang="en-US" sz="4000" kern="1200" dirty="0">
+                <a:solidFill>
+                  <a:srgbClr val="FFFFFF"/>
+                </a:solidFill>
+                <a:latin typeface="+mj-lt"/>
+                <a:ea typeface="+mj-ea"/>
+                <a:cs typeface="+mj-cs"/>
+              </a:rPr>
+              <a:t>RECURSOS NECESARIOS</a:t>
+            </a:r>
+          </a:p>
+        </p:txBody>
+      </p:sp>
+      <p:sp>
+        <p:nvSpPr>
+          <p:cNvPr id="8" name="CuadroTexto 7">
+            <a:extLst>
+              <a:ext uri="{FF2B5EF4-FFF2-40B4-BE49-F238E27FC236}">
+                <a16:creationId xmlns:a16="http://schemas.microsoft.com/office/drawing/2014/main" id="{268E5360-1D87-A008-2EDB-BDB723A39E43}"/>
+              </a:ext>
+            </a:extLst>
+          </p:cNvPr>
+          <p:cNvSpPr txBox="1"/>
+          <p:nvPr/>
+        </p:nvSpPr>
+        <p:spPr>
+          <a:xfrm>
+            <a:off x="4330354" y="1073889"/>
+            <a:ext cx="6966116" cy="4938690"/>
+          </a:xfrm>
+          <a:prstGeom prst="rect">
+            <a:avLst/>
+          </a:prstGeom>
+        </p:spPr>
+        <p:txBody>
+          <a:bodyPr vert="horz" lIns="91440" tIns="45720" rIns="91440" bIns="45720" rtlCol="0" anchor="b">
+            <a:noAutofit/>
+          </a:bodyPr>
+          <a:lstStyle/>
+          <a:p>
+            <a:pPr marL="742950" lvl="2" indent="-285750">
+              <a:lnSpc>
+                <a:spcPct val="90000"/>
+              </a:lnSpc>
+              <a:spcBef>
+                <a:spcPts val="1000"/>
+              </a:spcBef>
+              <a:buFont typeface="Arial" panose="020B0604020202020204" pitchFamily="34" charset="0"/>
+              <a:buChar char="•"/>
+            </a:pPr>
+            <a:endParaRPr lang="en-US" sz="1600" b="1" kern="1200" dirty="0">
+              <a:effectLst/>
+              <a:latin typeface="+mn-lt"/>
+              <a:ea typeface="+mn-ea"/>
+              <a:cs typeface="+mn-cs"/>
+            </a:endParaRPr>
+          </a:p>
+          <a:p>
+            <a:r>
+              <a:rPr lang="es-ES" sz="1100" dirty="0">
+                <a:effectLst/>
+                <a:latin typeface="Calibri" panose="020F0502020204030204" pitchFamily="34" charset="0"/>
+                <a:ea typeface="Calibri" panose="020F0502020204030204" pitchFamily="34" charset="0"/>
+              </a:rPr>
+              <a:t> </a:t>
+            </a:r>
+          </a:p>
+          <a:p>
+            <a:pPr marL="742950" lvl="1" indent="-285750">
+              <a:buFont typeface="Arial" panose="020B0604020202020204" pitchFamily="34" charset="0"/>
+              <a:buChar char="•"/>
+              <a:tabLst>
+                <a:tab pos="914400" algn="l"/>
+              </a:tabLst>
+            </a:pPr>
+            <a:r>
+              <a:rPr lang="en-US" sz="1600" b="1" dirty="0"/>
+              <a:t>Sistema </a:t>
+            </a:r>
+            <a:r>
+              <a:rPr lang="es-ES" sz="1600" b="1" dirty="0"/>
+              <a:t>Operativo</a:t>
+            </a:r>
+            <a:r>
+              <a:rPr lang="en-US" sz="1600" dirty="0"/>
+              <a:t>: Windows 10 Enterprise</a:t>
+            </a:r>
+            <a:endParaRPr lang="es-ES" sz="1600" dirty="0"/>
+          </a:p>
+          <a:p>
+            <a:pPr marL="742950" lvl="1" indent="-285750">
+              <a:buFont typeface="Arial" panose="020B0604020202020204" pitchFamily="34" charset="0"/>
+              <a:buChar char="•"/>
+              <a:tabLst>
+                <a:tab pos="914400" algn="l"/>
+              </a:tabLst>
+            </a:pPr>
+            <a:r>
+              <a:rPr lang="en-US" sz="1600" b="1" dirty="0"/>
+              <a:t>Oracle 19c</a:t>
+            </a:r>
+            <a:r>
+              <a:rPr lang="en-US" sz="1600" dirty="0"/>
+              <a:t>: para la </a:t>
+            </a:r>
+            <a:r>
+              <a:rPr lang="en-US" sz="1600" dirty="0" err="1"/>
+              <a:t>creación</a:t>
+            </a:r>
+            <a:r>
+              <a:rPr lang="en-US" sz="1600" dirty="0"/>
+              <a:t> de las </a:t>
+            </a:r>
+            <a:r>
+              <a:rPr lang="en-US" sz="1600" dirty="0" err="1"/>
+              <a:t>tablas</a:t>
+            </a:r>
+            <a:r>
+              <a:rPr lang="en-US" sz="1600" dirty="0"/>
+              <a:t> y para la </a:t>
+            </a:r>
+            <a:r>
+              <a:rPr lang="en-US" sz="1600" dirty="0" err="1"/>
+              <a:t>administración</a:t>
+            </a:r>
+            <a:r>
+              <a:rPr lang="en-US" sz="1600" dirty="0"/>
+              <a:t> de la base de </a:t>
+            </a:r>
+            <a:r>
+              <a:rPr lang="es-ES_tradnl" sz="1600" dirty="0"/>
+              <a:t>datos</a:t>
+            </a:r>
+            <a:r>
+              <a:rPr lang="en-US" sz="1600" dirty="0"/>
+              <a:t>.</a:t>
+            </a:r>
+            <a:endParaRPr lang="es-ES" sz="1600" dirty="0"/>
+          </a:p>
+          <a:p>
+            <a:pPr marL="742950" lvl="1" indent="-285750">
+              <a:buFont typeface="Arial" panose="020B0604020202020204" pitchFamily="34" charset="0"/>
+              <a:buChar char="•"/>
+              <a:tabLst>
+                <a:tab pos="914400" algn="l"/>
+              </a:tabLst>
+            </a:pPr>
+            <a:r>
+              <a:rPr lang="en-US" sz="1600" b="1" dirty="0"/>
+              <a:t>Oracle Live SQL</a:t>
+            </a:r>
+            <a:r>
+              <a:rPr lang="en-US" sz="1600" dirty="0"/>
+              <a:t>: para la </a:t>
+            </a:r>
+            <a:r>
+              <a:rPr lang="es-ES_tradnl" sz="1600" dirty="0"/>
+              <a:t>realización</a:t>
+            </a:r>
+            <a:r>
+              <a:rPr lang="en-US" sz="1600" dirty="0"/>
+              <a:t> y </a:t>
+            </a:r>
+            <a:r>
+              <a:rPr lang="es-ES" sz="1600" dirty="0"/>
+              <a:t>ejecución</a:t>
+            </a:r>
+            <a:r>
+              <a:rPr lang="en-US" sz="1600" dirty="0"/>
+              <a:t> de las </a:t>
+            </a:r>
+            <a:r>
+              <a:rPr lang="es-ES" sz="1600" dirty="0"/>
+              <a:t>consultas </a:t>
+            </a:r>
+          </a:p>
+          <a:p>
+            <a:pPr marL="742950" lvl="1" indent="-285750">
+              <a:buFont typeface="Arial" panose="020B0604020202020204" pitchFamily="34" charset="0"/>
+              <a:buChar char="•"/>
+              <a:tabLst>
+                <a:tab pos="914400" algn="l"/>
+              </a:tabLst>
+            </a:pPr>
+            <a:r>
+              <a:rPr lang="en-US" sz="1600" b="1" dirty="0" err="1"/>
+              <a:t>Arquitectura</a:t>
+            </a:r>
+            <a:r>
+              <a:rPr lang="en-US" sz="1600" b="1" dirty="0"/>
+              <a:t> </a:t>
+            </a:r>
+            <a:r>
+              <a:rPr lang="en-US" sz="1600" b="1" dirty="0" err="1"/>
+              <a:t>cliente-servidor</a:t>
+            </a:r>
+            <a:r>
+              <a:rPr lang="es-ES" sz="1600" dirty="0"/>
+              <a:t>: </a:t>
+            </a:r>
+            <a:r>
+              <a:rPr lang="es-ES_tradnl" sz="1600" dirty="0"/>
+              <a:t>es un tipo de desarrollo de software, en el que las diferentes labores se deciden entre los recursos, como son los servidores y los demandantes que son los clientes.</a:t>
+            </a:r>
+            <a:endParaRPr lang="es-ES" sz="1600" dirty="0"/>
+          </a:p>
+          <a:p>
+            <a:pPr marL="742950" lvl="1" indent="-285750">
+              <a:buFont typeface="Arial" panose="020B0604020202020204" pitchFamily="34" charset="0"/>
+              <a:buChar char="•"/>
+              <a:tabLst>
+                <a:tab pos="914400" algn="l"/>
+              </a:tabLst>
+            </a:pPr>
+            <a:r>
+              <a:rPr lang="es-ES" sz="1600" b="1" dirty="0"/>
+              <a:t>Requerimientos técnicos</a:t>
+            </a:r>
+            <a:r>
+              <a:rPr lang="en-US" sz="1600" dirty="0"/>
+              <a:t>: para </a:t>
+            </a:r>
+            <a:r>
+              <a:rPr lang="es-ES" sz="1600" dirty="0"/>
+              <a:t>instalar</a:t>
+            </a:r>
+            <a:r>
+              <a:rPr lang="en-US" sz="1600" dirty="0"/>
+              <a:t> la BBDD tanto </a:t>
+            </a:r>
+            <a:r>
+              <a:rPr lang="en-US" sz="1600" dirty="0" err="1"/>
+              <a:t>en</a:t>
+            </a:r>
+            <a:r>
+              <a:rPr lang="en-US" sz="1600" dirty="0"/>
+              <a:t> Windows </a:t>
+            </a:r>
+            <a:r>
+              <a:rPr lang="es-ES" sz="1600" dirty="0"/>
+              <a:t>como</a:t>
+            </a:r>
+            <a:r>
+              <a:rPr lang="en-US" sz="1600" dirty="0"/>
+              <a:t> </a:t>
+            </a:r>
+            <a:r>
+              <a:rPr lang="en-US" sz="1600" dirty="0" err="1"/>
+              <a:t>en</a:t>
+            </a:r>
+            <a:r>
+              <a:rPr lang="en-US" sz="1600" dirty="0"/>
+              <a:t> Linux, </a:t>
+            </a:r>
+            <a:r>
+              <a:rPr lang="es-ES" sz="1600" dirty="0"/>
+              <a:t>como mínimo deberemos</a:t>
+            </a:r>
+            <a:r>
+              <a:rPr lang="en-US" sz="1600" dirty="0"/>
+              <a:t> disponer de:</a:t>
+            </a:r>
+            <a:endParaRPr lang="es-ES" sz="1600" dirty="0"/>
+          </a:p>
+          <a:p>
+            <a:pPr marL="1600200" lvl="3" indent="-228600">
+              <a:buFont typeface="Arial" panose="020B0604020202020204" pitchFamily="34" charset="0"/>
+              <a:buChar char="•"/>
+              <a:tabLst>
+                <a:tab pos="1828800" algn="l"/>
+              </a:tabLst>
+            </a:pPr>
+            <a:r>
+              <a:rPr lang="en-US" sz="1600" dirty="0"/>
+              <a:t>4GB de RAM.</a:t>
+            </a:r>
+            <a:endParaRPr lang="es-ES" sz="1600" dirty="0"/>
+          </a:p>
+          <a:p>
+            <a:pPr marL="1600200" lvl="3" indent="-228600">
+              <a:buFont typeface="Arial" panose="020B0604020202020204" pitchFamily="34" charset="0"/>
+              <a:buChar char="•"/>
+              <a:tabLst>
+                <a:tab pos="1828800" algn="l"/>
+              </a:tabLst>
+            </a:pPr>
+            <a:r>
+              <a:rPr lang="en-US" sz="1600" dirty="0"/>
+              <a:t>1,4 GHz de </a:t>
+            </a:r>
+            <a:r>
+              <a:rPr lang="es-ES" sz="1600" dirty="0"/>
+              <a:t>procesador</a:t>
+            </a:r>
+            <a:r>
+              <a:rPr lang="en-US" sz="1600" dirty="0"/>
+              <a:t>.</a:t>
+            </a:r>
+            <a:endParaRPr lang="es-ES" sz="1600" dirty="0"/>
+          </a:p>
+          <a:p>
+            <a:pPr marL="1600200" lvl="3" indent="-228600">
+              <a:buFont typeface="Arial" panose="020B0604020202020204" pitchFamily="34" charset="0"/>
+              <a:buChar char="•"/>
+              <a:tabLst>
+                <a:tab pos="1828800" algn="l"/>
+              </a:tabLst>
+            </a:pPr>
+            <a:r>
+              <a:rPr lang="en-US" sz="1600" dirty="0"/>
+              <a:t>20GB de </a:t>
+            </a:r>
+            <a:r>
+              <a:rPr lang="es-ES" sz="1600" dirty="0"/>
+              <a:t>espacio</a:t>
+            </a:r>
+            <a:r>
+              <a:rPr lang="en-US" sz="1600" dirty="0"/>
+              <a:t> </a:t>
+            </a:r>
+            <a:r>
+              <a:rPr lang="en-US" sz="1600" dirty="0" err="1"/>
+              <a:t>en</a:t>
+            </a:r>
+            <a:r>
+              <a:rPr lang="en-US" sz="1600" dirty="0"/>
+              <a:t> disco.</a:t>
+            </a:r>
+            <a:endParaRPr lang="es-ES" sz="1600" dirty="0"/>
+          </a:p>
+          <a:p>
+            <a:pPr marL="1600200" lvl="3" indent="-228600">
+              <a:buFont typeface="Arial" panose="020B0604020202020204" pitchFamily="34" charset="0"/>
+              <a:buChar char="•"/>
+              <a:tabLst>
+                <a:tab pos="1828800" algn="l"/>
+              </a:tabLst>
+            </a:pPr>
+            <a:r>
+              <a:rPr lang="en-US" sz="1600" dirty="0"/>
+              <a:t>Si es Linux, se </a:t>
+            </a:r>
+            <a:r>
+              <a:rPr lang="es-ES" sz="1600" dirty="0"/>
+              <a:t>necesitará </a:t>
+            </a:r>
+            <a:r>
+              <a:rPr lang="en-US" sz="1600" dirty="0"/>
+              <a:t>que </a:t>
+            </a:r>
+            <a:r>
+              <a:rPr lang="es-ES" sz="1600" dirty="0"/>
+              <a:t>tenga</a:t>
+            </a:r>
+            <a:r>
+              <a:rPr lang="en-US" sz="1600" dirty="0"/>
+              <a:t> terminal o GUI (Graphics User Interfaces).</a:t>
+            </a:r>
+            <a:endParaRPr lang="es-ES" sz="1600" dirty="0"/>
+          </a:p>
+          <a:p>
+            <a:pPr marL="742950" lvl="2" indent="-285750">
+              <a:lnSpc>
+                <a:spcPct val="90000"/>
+              </a:lnSpc>
+              <a:spcBef>
+                <a:spcPts val="1000"/>
+              </a:spcBef>
+              <a:buFont typeface="Arial" panose="020B0604020202020204" pitchFamily="34" charset="0"/>
+              <a:buChar char="•"/>
+            </a:pPr>
+            <a:endParaRPr lang="es-ES" sz="1600" kern="1200" dirty="0">
+              <a:effectLst/>
+              <a:latin typeface="+mn-lt"/>
+              <a:ea typeface="+mn-ea"/>
+              <a:cs typeface="+mn-cs"/>
+            </a:endParaRPr>
+          </a:p>
+        </p:txBody>
+      </p:sp>
+      <p:sp>
+        <p:nvSpPr>
+          <p:cNvPr id="4" name="Subtítulo 2">
+            <a:extLst>
+              <a:ext uri="{FF2B5EF4-FFF2-40B4-BE49-F238E27FC236}">
+                <a16:creationId xmlns:a16="http://schemas.microsoft.com/office/drawing/2014/main" id="{B88B2EB6-8AD7-8CD7-4C80-7AEEA44F443C}"/>
+              </a:ext>
+            </a:extLst>
+          </p:cNvPr>
+          <p:cNvSpPr txBox="1">
+            <a:spLocks/>
+          </p:cNvSpPr>
+          <p:nvPr/>
+        </p:nvSpPr>
+        <p:spPr>
+          <a:xfrm>
+            <a:off x="8854750" y="5735638"/>
+            <a:ext cx="3337229" cy="1098395"/>
+          </a:xfrm>
+          <a:prstGeom prst="rect">
+            <a:avLst/>
+          </a:prstGeom>
+        </p:spPr>
+        <p:txBody>
+          <a:bodyPr vert="horz" lIns="91440" tIns="45720" rIns="91440" bIns="45720" rtlCol="0">
+            <a:normAutofit/>
+          </a:bodyPr>
+          <a:lstStyle>
+            <a:lvl1pPr marL="228600" indent="-228600" algn="l" defTabSz="914400" rtl="0" eaLnBrk="1" latinLnBrk="0" hangingPunct="1">
+              <a:lnSpc>
+                <a:spcPct val="90000"/>
+              </a:lnSpc>
+              <a:spcBef>
+                <a:spcPts val="1000"/>
+              </a:spcBef>
+              <a:buFont typeface="Arial" panose="020B0604020202020204" pitchFamily="34" charset="0"/>
+              <a:buChar char="•"/>
+              <a:defRPr sz="2800" kern="1200">
+                <a:solidFill>
+                  <a:schemeClr val="tx1"/>
+                </a:solidFill>
+                <a:latin typeface="+mn-lt"/>
+                <a:ea typeface="+mn-ea"/>
+                <a:cs typeface="+mn-cs"/>
+              </a:defRPr>
+            </a:lvl1pPr>
+            <a:lvl2pPr marL="685800" indent="-228600" algn="l" defTabSz="914400" rtl="0" eaLnBrk="1" latinLnBrk="0" hangingPunct="1">
+              <a:lnSpc>
+                <a:spcPct val="90000"/>
+              </a:lnSpc>
+              <a:spcBef>
+                <a:spcPts val="500"/>
+              </a:spcBef>
+              <a:buFont typeface="Arial" panose="020B0604020202020204" pitchFamily="34" charset="0"/>
+              <a:buChar char="•"/>
+              <a:defRPr sz="2400" kern="1200">
+                <a:solidFill>
+                  <a:schemeClr val="tx1"/>
+                </a:solidFill>
+                <a:latin typeface="+mn-lt"/>
+                <a:ea typeface="+mn-ea"/>
+                <a:cs typeface="+mn-cs"/>
+              </a:defRPr>
+            </a:lvl2pPr>
+            <a:lvl3pPr marL="1143000" indent="-228600" algn="l" defTabSz="914400" rtl="0" eaLnBrk="1" latinLnBrk="0" hangingPunct="1">
+              <a:lnSpc>
+                <a:spcPct val="90000"/>
+              </a:lnSpc>
+              <a:spcBef>
+                <a:spcPts val="500"/>
+              </a:spcBef>
+              <a:buFont typeface="Arial" panose="020B0604020202020204" pitchFamily="34" charset="0"/>
+              <a:buChar char="•"/>
+              <a:defRPr sz="2000" kern="1200">
+                <a:solidFill>
+                  <a:schemeClr val="tx1"/>
+                </a:solidFill>
+                <a:latin typeface="+mn-lt"/>
+                <a:ea typeface="+mn-ea"/>
+                <a:cs typeface="+mn-cs"/>
+              </a:defRPr>
+            </a:lvl3pPr>
+            <a:lvl4pPr marL="1600200" indent="-228600" algn="l" defTabSz="914400" rtl="0" eaLnBrk="1" latinLnBrk="0" hangingPunct="1">
+              <a:lnSpc>
+                <a:spcPct val="90000"/>
+              </a:lnSpc>
+              <a:spcBef>
+                <a:spcPts val="500"/>
+              </a:spcBef>
+              <a:buFont typeface="Arial" panose="020B0604020202020204" pitchFamily="34" charset="0"/>
+              <a:buChar char="•"/>
+              <a:defRPr sz="1800" kern="1200">
+                <a:solidFill>
+                  <a:schemeClr val="tx1"/>
+                </a:solidFill>
+                <a:latin typeface="+mn-lt"/>
+                <a:ea typeface="+mn-ea"/>
+                <a:cs typeface="+mn-cs"/>
+              </a:defRPr>
+            </a:lvl4pPr>
+            <a:lvl5pPr marL="2057400" indent="-228600" algn="l" defTabSz="914400" rtl="0" eaLnBrk="1" latinLnBrk="0" hangingPunct="1">
+              <a:lnSpc>
+                <a:spcPct val="90000"/>
+              </a:lnSpc>
+              <a:spcBef>
+                <a:spcPts val="500"/>
+              </a:spcBef>
+              <a:buFont typeface="Arial" panose="020B0604020202020204" pitchFamily="34" charset="0"/>
+              <a:buChar char="•"/>
+              <a:defRPr sz="1800" kern="1200">
+                <a:solidFill>
+                  <a:schemeClr val="tx1"/>
+                </a:solidFill>
+                <a:latin typeface="+mn-lt"/>
+                <a:ea typeface="+mn-ea"/>
+                <a:cs typeface="+mn-cs"/>
+              </a:defRPr>
+            </a:lvl5pPr>
+            <a:lvl6pPr marL="2514600" indent="-228600" algn="l" defTabSz="914400" rtl="0" eaLnBrk="1" latinLnBrk="0" hangingPunct="1">
+              <a:lnSpc>
+                <a:spcPct val="90000"/>
+              </a:lnSpc>
+              <a:spcBef>
+                <a:spcPts val="500"/>
+              </a:spcBef>
+              <a:buFont typeface="Arial" panose="020B0604020202020204" pitchFamily="34" charset="0"/>
+              <a:buChar char="•"/>
+              <a:defRPr sz="1800" kern="1200">
+                <a:solidFill>
+                  <a:schemeClr val="tx1"/>
+                </a:solidFill>
+                <a:latin typeface="+mn-lt"/>
+                <a:ea typeface="+mn-ea"/>
+                <a:cs typeface="+mn-cs"/>
+              </a:defRPr>
+            </a:lvl6pPr>
+            <a:lvl7pPr marL="2971800" indent="-228600" algn="l" defTabSz="914400" rtl="0" eaLnBrk="1" latinLnBrk="0" hangingPunct="1">
+              <a:lnSpc>
+                <a:spcPct val="90000"/>
+              </a:lnSpc>
+              <a:spcBef>
+                <a:spcPts val="500"/>
+              </a:spcBef>
+              <a:buFont typeface="Arial" panose="020B0604020202020204" pitchFamily="34" charset="0"/>
+              <a:buChar char="•"/>
+              <a:defRPr sz="1800" kern="1200">
+                <a:solidFill>
+                  <a:schemeClr val="tx1"/>
+                </a:solidFill>
+                <a:latin typeface="+mn-lt"/>
+                <a:ea typeface="+mn-ea"/>
+                <a:cs typeface="+mn-cs"/>
+              </a:defRPr>
+            </a:lvl7pPr>
+            <a:lvl8pPr marL="3429000" indent="-228600" algn="l" defTabSz="914400" rtl="0" eaLnBrk="1" latinLnBrk="0" hangingPunct="1">
+              <a:lnSpc>
+                <a:spcPct val="90000"/>
+              </a:lnSpc>
+              <a:spcBef>
+                <a:spcPts val="500"/>
+              </a:spcBef>
+              <a:buFont typeface="Arial" panose="020B0604020202020204" pitchFamily="34" charset="0"/>
+              <a:buChar char="•"/>
+              <a:defRPr sz="1800" kern="1200">
+                <a:solidFill>
+                  <a:schemeClr val="tx1"/>
+                </a:solidFill>
+                <a:latin typeface="+mn-lt"/>
+                <a:ea typeface="+mn-ea"/>
+                <a:cs typeface="+mn-cs"/>
+              </a:defRPr>
+            </a:lvl8pPr>
+            <a:lvl9pPr marL="3886200" indent="-228600" algn="l" defTabSz="914400" rtl="0" eaLnBrk="1" latinLnBrk="0" hangingPunct="1">
+              <a:lnSpc>
+                <a:spcPct val="90000"/>
+              </a:lnSpc>
+              <a:spcBef>
+                <a:spcPts val="500"/>
+              </a:spcBef>
+              <a:buFont typeface="Arial" panose="020B0604020202020204" pitchFamily="34" charset="0"/>
+              <a:buChar char="•"/>
+              <a:defRPr sz="1800" kern="1200">
+                <a:solidFill>
+                  <a:schemeClr val="tx1"/>
+                </a:solidFill>
+                <a:latin typeface="+mn-lt"/>
+                <a:ea typeface="+mn-ea"/>
+                <a:cs typeface="+mn-cs"/>
+              </a:defRPr>
+            </a:lvl9pPr>
+          </a:lstStyle>
+          <a:p>
+            <a:r>
+              <a:rPr lang="es-ES" sz="1100" dirty="0">
+                <a:solidFill>
+                  <a:srgbClr val="FFFFFF"/>
+                </a:solidFill>
+              </a:rPr>
+              <a:t>Eduardo Martín-Sonseca Alonso</a:t>
+            </a:r>
+          </a:p>
+          <a:p>
+            <a:r>
+              <a:rPr lang="es-ES" sz="1100" dirty="0">
+                <a:solidFill>
+                  <a:srgbClr val="FFFFFF"/>
+                </a:solidFill>
+              </a:rPr>
+              <a:t>Noel Prieto Pardo</a:t>
+            </a:r>
+          </a:p>
+          <a:p>
+            <a:r>
+              <a:rPr lang="es-ES" sz="1100" dirty="0">
+                <a:solidFill>
+                  <a:srgbClr val="FFFFFF"/>
+                </a:solidFill>
+              </a:rPr>
+              <a:t>Mario Ortuñez Sanz</a:t>
+            </a:r>
+          </a:p>
+          <a:p>
+            <a:r>
+              <a:rPr lang="es-ES" sz="1100" b="1" dirty="0">
+                <a:solidFill>
+                  <a:srgbClr val="FFFFFF"/>
+                </a:solidFill>
+              </a:rPr>
+              <a:t>1º Desarrollo de Aplicaciones Multiplataforma</a:t>
+            </a:r>
+          </a:p>
+        </p:txBody>
+      </p:sp>
+    </p:spTree>
+    <p:extLst>
+      <p:ext uri="{BB962C8B-B14F-4D97-AF65-F5344CB8AC3E}">
+        <p14:creationId xmlns:p14="http://schemas.microsoft.com/office/powerpoint/2010/main" val="352285335"/>
+      </p:ext>
+    </p:extLst>
+  </p:cSld>
+  <p:clrMapOvr>
+    <a:masterClrMapping/>
+  </p:clrMapOvr>
+</p:sld>
+</file>
+
+<file path=ppt/slides/slide21.xml><?xml version="1.0" encoding="utf-8"?>
 <p:sld xmlns:a="http://schemas.openxmlformats.org/drawingml/2006/main" xmlns:r="http://schemas.openxmlformats.org/officeDocument/2006/relationships" xmlns:p="http://schemas.openxmlformats.org/presentationml/2006/main">
   <p:cSld>
     <p:bg>
@@ -18381,7 +19302,7 @@
 </p:sld>
 </file>
 
-<file path=ppt/slides/slide21.xml><?xml version="1.0" encoding="utf-8"?>
+<file path=ppt/slides/slide22.xml><?xml version="1.0" encoding="utf-8"?>
 <p:sld xmlns:a="http://schemas.openxmlformats.org/drawingml/2006/main" xmlns:r="http://schemas.openxmlformats.org/officeDocument/2006/relationships" xmlns:p="http://schemas.openxmlformats.org/presentationml/2006/main">
   <p:cSld>
     <p:bg>

</xml_diff>